<commit_message>
added Fast flush state and modified .pptx. Still need to update .svg schematic
</commit_message>
<xml_diff>
--- a/Valve config.pptx
+++ b/Valve config.pptx
@@ -197,7 +197,7 @@
           <a:p>
             <a:fld id="{EE6BEC3B-6F85-4302-8908-900C0D6C4FEC}" type="datetimeFigureOut">
               <a:rPr lang="en-FI" smtClean="0"/>
-              <a:t>26/03/2025</a:t>
+              <a:t>04/04/2025</a:t>
             </a:fld>
             <a:endParaRPr lang="en-FI"/>
           </a:p>
@@ -722,7 +722,7 @@
           <a:p>
             <a:fld id="{86A0A194-F300-4491-8CC8-FAE241B806F0}" type="datetimeFigureOut">
               <a:rPr lang="en-FI" smtClean="0"/>
-              <a:t>26/03/2025</a:t>
+              <a:t>04/04/2025</a:t>
             </a:fld>
             <a:endParaRPr lang="en-FI"/>
           </a:p>
@@ -922,7 +922,7 @@
           <a:p>
             <a:fld id="{86A0A194-F300-4491-8CC8-FAE241B806F0}" type="datetimeFigureOut">
               <a:rPr lang="en-FI" smtClean="0"/>
-              <a:t>26/03/2025</a:t>
+              <a:t>04/04/2025</a:t>
             </a:fld>
             <a:endParaRPr lang="en-FI"/>
           </a:p>
@@ -1132,7 +1132,7 @@
           <a:p>
             <a:fld id="{86A0A194-F300-4491-8CC8-FAE241B806F0}" type="datetimeFigureOut">
               <a:rPr lang="en-FI" smtClean="0"/>
-              <a:t>26/03/2025</a:t>
+              <a:t>04/04/2025</a:t>
             </a:fld>
             <a:endParaRPr lang="en-FI"/>
           </a:p>
@@ -1332,7 +1332,7 @@
           <a:p>
             <a:fld id="{86A0A194-F300-4491-8CC8-FAE241B806F0}" type="datetimeFigureOut">
               <a:rPr lang="en-FI" smtClean="0"/>
-              <a:t>26/03/2025</a:t>
+              <a:t>04/04/2025</a:t>
             </a:fld>
             <a:endParaRPr lang="en-FI"/>
           </a:p>
@@ -1608,7 +1608,7 @@
           <a:p>
             <a:fld id="{86A0A194-F300-4491-8CC8-FAE241B806F0}" type="datetimeFigureOut">
               <a:rPr lang="en-FI" smtClean="0"/>
-              <a:t>26/03/2025</a:t>
+              <a:t>04/04/2025</a:t>
             </a:fld>
             <a:endParaRPr lang="en-FI"/>
           </a:p>
@@ -1876,7 +1876,7 @@
           <a:p>
             <a:fld id="{86A0A194-F300-4491-8CC8-FAE241B806F0}" type="datetimeFigureOut">
               <a:rPr lang="en-FI" smtClean="0"/>
-              <a:t>26/03/2025</a:t>
+              <a:t>04/04/2025</a:t>
             </a:fld>
             <a:endParaRPr lang="en-FI"/>
           </a:p>
@@ -2291,7 +2291,7 @@
           <a:p>
             <a:fld id="{86A0A194-F300-4491-8CC8-FAE241B806F0}" type="datetimeFigureOut">
               <a:rPr lang="en-FI" smtClean="0"/>
-              <a:t>26/03/2025</a:t>
+              <a:t>04/04/2025</a:t>
             </a:fld>
             <a:endParaRPr lang="en-FI"/>
           </a:p>
@@ -2433,7 +2433,7 @@
           <a:p>
             <a:fld id="{86A0A194-F300-4491-8CC8-FAE241B806F0}" type="datetimeFigureOut">
               <a:rPr lang="en-FI" smtClean="0"/>
-              <a:t>26/03/2025</a:t>
+              <a:t>04/04/2025</a:t>
             </a:fld>
             <a:endParaRPr lang="en-FI"/>
           </a:p>
@@ -2546,7 +2546,7 @@
           <a:p>
             <a:fld id="{86A0A194-F300-4491-8CC8-FAE241B806F0}" type="datetimeFigureOut">
               <a:rPr lang="en-FI" smtClean="0"/>
-              <a:t>26/03/2025</a:t>
+              <a:t>04/04/2025</a:t>
             </a:fld>
             <a:endParaRPr lang="en-FI"/>
           </a:p>
@@ -2859,7 +2859,7 @@
           <a:p>
             <a:fld id="{86A0A194-F300-4491-8CC8-FAE241B806F0}" type="datetimeFigureOut">
               <a:rPr lang="en-FI" smtClean="0"/>
-              <a:t>26/03/2025</a:t>
+              <a:t>04/04/2025</a:t>
             </a:fld>
             <a:endParaRPr lang="en-FI"/>
           </a:p>
@@ -3148,7 +3148,7 @@
           <a:p>
             <a:fld id="{86A0A194-F300-4491-8CC8-FAE241B806F0}" type="datetimeFigureOut">
               <a:rPr lang="en-FI" smtClean="0"/>
-              <a:t>26/03/2025</a:t>
+              <a:t>04/04/2025</a:t>
             </a:fld>
             <a:endParaRPr lang="en-FI"/>
           </a:p>
@@ -3391,7 +3391,7 @@
           <a:p>
             <a:fld id="{86A0A194-F300-4491-8CC8-FAE241B806F0}" type="datetimeFigureOut">
               <a:rPr lang="en-FI" smtClean="0"/>
-              <a:t>26/03/2025</a:t>
+              <a:t>04/04/2025</a:t>
             </a:fld>
             <a:endParaRPr lang="en-FI"/>
           </a:p>
@@ -3816,6 +3816,135 @@
       </p:grpSpPr>
       <p:cxnSp>
         <p:nvCxnSpPr>
+          <p:cNvPr id="60" name="Straight Connector 59">
+            <a:extLst>
+              <a:ext uri="{FF2B5EF4-FFF2-40B4-BE49-F238E27FC236}">
+                <a16:creationId xmlns:a16="http://schemas.microsoft.com/office/drawing/2014/main" id="{C7ABF623-EC09-5CA9-2EA0-E92FA69B6C45}"/>
+              </a:ext>
+            </a:extLst>
+          </p:cNvPr>
+          <p:cNvCxnSpPr>
+            <a:cxnSpLocks/>
+          </p:cNvCxnSpPr>
+          <p:nvPr/>
+        </p:nvCxnSpPr>
+        <p:spPr>
+          <a:xfrm flipH="1" flipV="1">
+            <a:off x="408884" y="2052414"/>
+            <a:ext cx="4806422" cy="23548"/>
+          </a:xfrm>
+          <a:prstGeom prst="line">
+            <a:avLst/>
+          </a:prstGeom>
+          <a:ln w="57150">
+            <a:solidFill>
+              <a:srgbClr val="C00000"/>
+            </a:solidFill>
+          </a:ln>
+        </p:spPr>
+        <p:style>
+          <a:lnRef idx="1">
+            <a:schemeClr val="accent1"/>
+          </a:lnRef>
+          <a:fillRef idx="0">
+            <a:schemeClr val="accent1"/>
+          </a:fillRef>
+          <a:effectRef idx="0">
+            <a:schemeClr val="accent1"/>
+          </a:effectRef>
+          <a:fontRef idx="minor">
+            <a:schemeClr val="tx1"/>
+          </a:fontRef>
+        </p:style>
+      </p:cxnSp>
+      <p:cxnSp>
+        <p:nvCxnSpPr>
+          <p:cNvPr id="113" name="Straight Connector 112">
+            <a:extLst>
+              <a:ext uri="{FF2B5EF4-FFF2-40B4-BE49-F238E27FC236}">
+                <a16:creationId xmlns:a16="http://schemas.microsoft.com/office/drawing/2014/main" id="{1B053E98-663B-DBFF-AE25-65F105FA605F}"/>
+              </a:ext>
+            </a:extLst>
+          </p:cNvPr>
+          <p:cNvCxnSpPr>
+            <a:cxnSpLocks/>
+          </p:cNvCxnSpPr>
+          <p:nvPr/>
+        </p:nvCxnSpPr>
+        <p:spPr>
+          <a:xfrm flipV="1">
+            <a:off x="5215306" y="1464557"/>
+            <a:ext cx="0" cy="1536813"/>
+          </a:xfrm>
+          <a:prstGeom prst="line">
+            <a:avLst/>
+          </a:prstGeom>
+          <a:ln w="57150">
+            <a:solidFill>
+              <a:srgbClr val="C00000"/>
+            </a:solidFill>
+            <a:headEnd type="arrow"/>
+            <a:tailEnd type="none"/>
+          </a:ln>
+        </p:spPr>
+        <p:style>
+          <a:lnRef idx="1">
+            <a:schemeClr val="accent1"/>
+          </a:lnRef>
+          <a:fillRef idx="0">
+            <a:schemeClr val="accent1"/>
+          </a:fillRef>
+          <a:effectRef idx="0">
+            <a:schemeClr val="accent1"/>
+          </a:effectRef>
+          <a:fontRef idx="minor">
+            <a:schemeClr val="tx1"/>
+          </a:fontRef>
+        </p:style>
+      </p:cxnSp>
+      <p:cxnSp>
+        <p:nvCxnSpPr>
+          <p:cNvPr id="83" name="Straight Connector 82">
+            <a:extLst>
+              <a:ext uri="{FF2B5EF4-FFF2-40B4-BE49-F238E27FC236}">
+                <a16:creationId xmlns:a16="http://schemas.microsoft.com/office/drawing/2014/main" id="{AECE0EDB-D028-A3C7-AA77-2E52FDFA20EC}"/>
+              </a:ext>
+            </a:extLst>
+          </p:cNvPr>
+          <p:cNvCxnSpPr/>
+          <p:nvPr/>
+        </p:nvCxnSpPr>
+        <p:spPr>
+          <a:xfrm>
+            <a:off x="1469068" y="2603052"/>
+            <a:ext cx="8792" cy="1602436"/>
+          </a:xfrm>
+          <a:prstGeom prst="line">
+            <a:avLst/>
+          </a:prstGeom>
+          <a:ln w="57150">
+            <a:solidFill>
+              <a:srgbClr val="C00000"/>
+            </a:solidFill>
+          </a:ln>
+        </p:spPr>
+        <p:style>
+          <a:lnRef idx="1">
+            <a:schemeClr val="accent1"/>
+          </a:lnRef>
+          <a:fillRef idx="0">
+            <a:schemeClr val="accent1"/>
+          </a:fillRef>
+          <a:effectRef idx="0">
+            <a:schemeClr val="accent1"/>
+          </a:effectRef>
+          <a:fontRef idx="minor">
+            <a:schemeClr val="tx1"/>
+          </a:fontRef>
+        </p:style>
+      </p:cxnSp>
+      <p:cxnSp>
+        <p:nvCxnSpPr>
           <p:cNvPr id="149" name="Straight Connector 148">
             <a:extLst>
               <a:ext uri="{FF2B5EF4-FFF2-40B4-BE49-F238E27FC236}">
@@ -5254,49 +5383,6 @@
       </p:cxnSp>
       <p:cxnSp>
         <p:nvCxnSpPr>
-          <p:cNvPr id="60" name="Straight Connector 59">
-            <a:extLst>
-              <a:ext uri="{FF2B5EF4-FFF2-40B4-BE49-F238E27FC236}">
-                <a16:creationId xmlns:a16="http://schemas.microsoft.com/office/drawing/2014/main" id="{C7ABF623-EC09-5CA9-2EA0-E92FA69B6C45}"/>
-              </a:ext>
-            </a:extLst>
-          </p:cNvPr>
-          <p:cNvCxnSpPr>
-            <a:cxnSpLocks/>
-          </p:cNvCxnSpPr>
-          <p:nvPr/>
-        </p:nvCxnSpPr>
-        <p:spPr>
-          <a:xfrm flipH="1" flipV="1">
-            <a:off x="408884" y="2052414"/>
-            <a:ext cx="4806422" cy="23548"/>
-          </a:xfrm>
-          <a:prstGeom prst="line">
-            <a:avLst/>
-          </a:prstGeom>
-          <a:ln w="57150">
-            <a:solidFill>
-              <a:srgbClr val="C00000"/>
-            </a:solidFill>
-          </a:ln>
-        </p:spPr>
-        <p:style>
-          <a:lnRef idx="1">
-            <a:schemeClr val="accent1"/>
-          </a:lnRef>
-          <a:fillRef idx="0">
-            <a:schemeClr val="accent1"/>
-          </a:fillRef>
-          <a:effectRef idx="0">
-            <a:schemeClr val="accent1"/>
-          </a:effectRef>
-          <a:fontRef idx="minor">
-            <a:schemeClr val="tx1"/>
-          </a:fontRef>
-        </p:style>
-      </p:cxnSp>
-      <p:cxnSp>
-        <p:nvCxnSpPr>
           <p:cNvPr id="64" name="Straight Connector 63">
             <a:extLst>
               <a:ext uri="{FF2B5EF4-FFF2-40B4-BE49-F238E27FC236}">
@@ -5426,47 +5512,6 @@
       </p:cxnSp>
       <p:cxnSp>
         <p:nvCxnSpPr>
-          <p:cNvPr id="83" name="Straight Connector 82">
-            <a:extLst>
-              <a:ext uri="{FF2B5EF4-FFF2-40B4-BE49-F238E27FC236}">
-                <a16:creationId xmlns:a16="http://schemas.microsoft.com/office/drawing/2014/main" id="{AECE0EDB-D028-A3C7-AA77-2E52FDFA20EC}"/>
-              </a:ext>
-            </a:extLst>
-          </p:cNvPr>
-          <p:cNvCxnSpPr/>
-          <p:nvPr/>
-        </p:nvCxnSpPr>
-        <p:spPr>
-          <a:xfrm>
-            <a:off x="1469068" y="2603052"/>
-            <a:ext cx="8792" cy="1602436"/>
-          </a:xfrm>
-          <a:prstGeom prst="line">
-            <a:avLst/>
-          </a:prstGeom>
-          <a:ln w="57150">
-            <a:solidFill>
-              <a:srgbClr val="C00000"/>
-            </a:solidFill>
-          </a:ln>
-        </p:spPr>
-        <p:style>
-          <a:lnRef idx="1">
-            <a:schemeClr val="accent1"/>
-          </a:lnRef>
-          <a:fillRef idx="0">
-            <a:schemeClr val="accent1"/>
-          </a:fillRef>
-          <a:effectRef idx="0">
-            <a:schemeClr val="accent1"/>
-          </a:effectRef>
-          <a:fontRef idx="minor">
-            <a:schemeClr val="tx1"/>
-          </a:fontRef>
-        </p:style>
-      </p:cxnSp>
-      <p:cxnSp>
-        <p:nvCxnSpPr>
           <p:cNvPr id="86" name="Straight Connector 85">
             <a:extLst>
               <a:ext uri="{FF2B5EF4-FFF2-40B4-BE49-F238E27FC236}">
@@ -5630,51 +5675,6 @@
           <a:xfrm>
             <a:off x="97660" y="1464754"/>
             <a:ext cx="2044617" cy="0"/>
-          </a:xfrm>
-          <a:prstGeom prst="line">
-            <a:avLst/>
-          </a:prstGeom>
-          <a:ln w="57150">
-            <a:solidFill>
-              <a:srgbClr val="C00000"/>
-            </a:solidFill>
-            <a:headEnd type="arrow"/>
-            <a:tailEnd type="none"/>
-          </a:ln>
-        </p:spPr>
-        <p:style>
-          <a:lnRef idx="1">
-            <a:schemeClr val="accent1"/>
-          </a:lnRef>
-          <a:fillRef idx="0">
-            <a:schemeClr val="accent1"/>
-          </a:fillRef>
-          <a:effectRef idx="0">
-            <a:schemeClr val="accent1"/>
-          </a:effectRef>
-          <a:fontRef idx="minor">
-            <a:schemeClr val="tx1"/>
-          </a:fontRef>
-        </p:style>
-      </p:cxnSp>
-      <p:cxnSp>
-        <p:nvCxnSpPr>
-          <p:cNvPr id="113" name="Straight Connector 112">
-            <a:extLst>
-              <a:ext uri="{FF2B5EF4-FFF2-40B4-BE49-F238E27FC236}">
-                <a16:creationId xmlns:a16="http://schemas.microsoft.com/office/drawing/2014/main" id="{1B053E98-663B-DBFF-AE25-65F105FA605F}"/>
-              </a:ext>
-            </a:extLst>
-          </p:cNvPr>
-          <p:cNvCxnSpPr>
-            <a:cxnSpLocks/>
-          </p:cNvCxnSpPr>
-          <p:nvPr/>
-        </p:nvCxnSpPr>
-        <p:spPr>
-          <a:xfrm flipV="1">
-            <a:off x="5215306" y="1464557"/>
-            <a:ext cx="0" cy="1222827"/>
           </a:xfrm>
           <a:prstGeom prst="line">
             <a:avLst/>
@@ -6431,14 +6431,14 @@
           <p:nvPr>
             <p:extLst>
               <p:ext uri="{D42A27DB-BD31-4B8C-83A1-F6EECF244321}">
-                <p14:modId xmlns:p14="http://schemas.microsoft.com/office/powerpoint/2010/main" val="3636278035"/>
+                <p14:modId xmlns:p14="http://schemas.microsoft.com/office/powerpoint/2010/main" val="397658406"/>
               </p:ext>
             </p:extLst>
           </p:nvPr>
         </p:nvGraphicFramePr>
         <p:xfrm>
           <a:off x="4827116" y="3674132"/>
-          <a:ext cx="6672733" cy="2199650"/>
+          <a:ext cx="6672733" cy="2565410"/>
         </p:xfrm>
         <a:graphic>
           <a:graphicData uri="http://schemas.openxmlformats.org/drawingml/2006/table">
@@ -6787,6 +6787,111 @@
                     <a:p>
                       <a:r>
                         <a:rPr lang="en-US" sz="1200" dirty="0"/>
+                        <a:t>Fast Flush</a:t>
+                      </a:r>
+                    </a:p>
+                  </a:txBody>
+                  <a:tcPr/>
+                </a:tc>
+                <a:tc>
+                  <a:txBody>
+                    <a:bodyPr/>
+                    <a:lstStyle/>
+                    <a:p>
+                      <a:r>
+                        <a:rPr lang="en-US" sz="900" dirty="0">
+                          <a:solidFill>
+                            <a:schemeClr val="tx1"/>
+                          </a:solidFill>
+                        </a:rPr>
+                        <a:t>Step before evac to </a:t>
+                      </a:r>
+                      <a:r>
+                        <a:rPr lang="en-US" sz="900" dirty="0" err="1">
+                          <a:solidFill>
+                            <a:schemeClr val="tx1"/>
+                          </a:solidFill>
+                        </a:rPr>
+                        <a:t>P_meas</a:t>
+                      </a:r>
+                      <a:r>
+                        <a:rPr lang="en-US" sz="900" dirty="0">
+                          <a:solidFill>
+                            <a:schemeClr val="tx1"/>
+                          </a:solidFill>
+                        </a:rPr>
+                        <a:t> (how long active will be determined experimentally)</a:t>
+                      </a:r>
+                    </a:p>
+                  </a:txBody>
+                  <a:tcPr/>
+                </a:tc>
+                <a:tc>
+                  <a:txBody>
+                    <a:bodyPr/>
+                    <a:lstStyle/>
+                    <a:p>
+                      <a:r>
+                        <a:rPr lang="en-US" sz="1400" dirty="0"/>
+                        <a:t>0</a:t>
+                      </a:r>
+                    </a:p>
+                  </a:txBody>
+                  <a:tcPr/>
+                </a:tc>
+                <a:tc>
+                  <a:txBody>
+                    <a:bodyPr/>
+                    <a:lstStyle/>
+                    <a:p>
+                      <a:r>
+                        <a:rPr lang="en-US" sz="1400" dirty="0"/>
+                        <a:t>1</a:t>
+                      </a:r>
+                    </a:p>
+                  </a:txBody>
+                  <a:tcPr/>
+                </a:tc>
+                <a:tc>
+                  <a:txBody>
+                    <a:bodyPr/>
+                    <a:lstStyle/>
+                    <a:p>
+                      <a:r>
+                        <a:rPr lang="en-US" sz="1400" dirty="0"/>
+                        <a:t>1</a:t>
+                      </a:r>
+                    </a:p>
+                  </a:txBody>
+                  <a:tcPr/>
+                </a:tc>
+                <a:tc>
+                  <a:txBody>
+                    <a:bodyPr/>
+                    <a:lstStyle/>
+                    <a:p>
+                      <a:r>
+                        <a:rPr lang="en-US" sz="1400" dirty="0"/>
+                        <a:t>0</a:t>
+                      </a:r>
+                    </a:p>
+                  </a:txBody>
+                  <a:tcPr/>
+                </a:tc>
+                <a:extLst>
+                  <a:ext uri="{0D108BD9-81ED-4DB2-BD59-A6C34878D82A}">
+                    <a16:rowId xmlns:a16="http://schemas.microsoft.com/office/drawing/2014/main" val="2388859131"/>
+                  </a:ext>
+                </a:extLst>
+              </a:tr>
+              <a:tr h="286234">
+                <a:tc>
+                  <a:txBody>
+                    <a:bodyPr/>
+                    <a:lstStyle/>
+                    <a:p>
+                      <a:r>
+                        <a:rPr lang="en-US" sz="1200" dirty="0"/>
                         <a:t>Evac to </a:t>
                       </a:r>
                       <a:r>
@@ -8077,7 +8182,7 @@
         <p:spPr>
           <a:xfrm>
             <a:off x="8039942" y="924476"/>
-            <a:ext cx="3052980" cy="2308324"/>
+            <a:ext cx="3052980" cy="2585323"/>
           </a:xfrm>
           <a:prstGeom prst="rect">
             <a:avLst/>
@@ -8209,6 +8314,21 @@
                 </a:solidFill>
               </a:rPr>
               <a:t>Measure_pressure</a:t>
+            </a:r>
+            <a:endParaRPr lang="en-US" dirty="0">
+              <a:solidFill>
+                <a:srgbClr val="00B050"/>
+              </a:solidFill>
+            </a:endParaRPr>
+          </a:p>
+          <a:p>
+            <a:r>
+              <a:rPr lang="en-US" dirty="0" err="1">
+                <a:solidFill>
+                  <a:srgbClr val="00B050"/>
+                </a:solidFill>
+              </a:rPr>
+              <a:t>FF_time</a:t>
             </a:r>
             <a:endParaRPr lang="en-US" dirty="0"/>
           </a:p>

</xml_diff>